<commit_message>
Added Peter's name to title slide
</commit_message>
<xml_diff>
--- a/2015/2015_TSAPS.pptx
+++ b/2015/2015_TSAPS.pptx
@@ -238,7 +238,7 @@
           <a:p>
             <a:fld id="{6096A192-89F2-44C6-B07F-1B83CE44D511}" type="datetimeFigureOut">
               <a:rPr lang="en-US" smtClean="0"/>
-              <a:t>10/28/2015</a:t>
+              <a:t>10/30/2015</a:t>
             </a:fld>
             <a:endParaRPr lang="en-US"/>
           </a:p>
@@ -2226,7 +2226,7 @@
           <a:p>
             <a:fld id="{7181039F-CB0C-E14D-A7EF-3BACE2CEF4EA}" type="datetimeFigureOut">
               <a:rPr lang="en-US" smtClean="0"/>
-              <a:t>10/28/2015</a:t>
+              <a:t>10/30/2015</a:t>
             </a:fld>
             <a:endParaRPr lang="en-US"/>
           </a:p>
@@ -2456,7 +2456,7 @@
           <a:p>
             <a:fld id="{7181039F-CB0C-E14D-A7EF-3BACE2CEF4EA}" type="datetimeFigureOut">
               <a:rPr lang="en-US" smtClean="0"/>
-              <a:t>10/28/2015</a:t>
+              <a:t>10/30/2015</a:t>
             </a:fld>
             <a:endParaRPr lang="en-US"/>
           </a:p>
@@ -2721,7 +2721,7 @@
           <a:p>
             <a:fld id="{7181039F-CB0C-E14D-A7EF-3BACE2CEF4EA}" type="datetimeFigureOut">
               <a:rPr lang="en-US" smtClean="0"/>
-              <a:t>10/28/2015</a:t>
+              <a:t>10/30/2015</a:t>
             </a:fld>
             <a:endParaRPr lang="en-US"/>
           </a:p>
@@ -2884,7 +2884,7 @@
           <a:p>
             <a:fld id="{7181039F-CB0C-E14D-A7EF-3BACE2CEF4EA}" type="datetimeFigureOut">
               <a:rPr lang="en-US" smtClean="0"/>
-              <a:t>10/28/2015</a:t>
+              <a:t>10/30/2015</a:t>
             </a:fld>
             <a:endParaRPr lang="en-US"/>
           </a:p>
@@ -3161,7 +3161,7 @@
           <a:p>
             <a:fld id="{7181039F-CB0C-E14D-A7EF-3BACE2CEF4EA}" type="datetimeFigureOut">
               <a:rPr lang="en-US" smtClean="0"/>
-              <a:t>10/28/2015</a:t>
+              <a:t>10/30/2015</a:t>
             </a:fld>
             <a:endParaRPr lang="en-US"/>
           </a:p>
@@ -3416,7 +3416,7 @@
           <a:p>
             <a:fld id="{7181039F-CB0C-E14D-A7EF-3BACE2CEF4EA}" type="datetimeFigureOut">
               <a:rPr lang="en-US" smtClean="0"/>
-              <a:t>10/28/2015</a:t>
+              <a:t>10/30/2015</a:t>
             </a:fld>
             <a:endParaRPr lang="en-US"/>
           </a:p>
@@ -3629,7 +3629,7 @@
           <a:p>
             <a:fld id="{7181039F-CB0C-E14D-A7EF-3BACE2CEF4EA}" type="datetimeFigureOut">
               <a:rPr lang="en-US" smtClean="0"/>
-              <a:t>10/28/2015</a:t>
+              <a:t>10/30/2015</a:t>
             </a:fld>
             <a:endParaRPr lang="en-US"/>
           </a:p>
@@ -4066,6 +4066,18 @@
                 <a:latin typeface="Montserrat Light" panose="00000400000000000000" pitchFamily="50" charset="0"/>
               </a:rPr>
               <a:t>Gerity</a:t>
+            </a:r>
+            <a:r>
+              <a:rPr lang="en-US" sz="2000" dirty="0" smtClean="0">
+                <a:latin typeface="Montserrat Light" panose="00000400000000000000" pitchFamily="50" charset="0"/>
+              </a:rPr>
+              <a:t>, </a:t>
+            </a:r>
+            <a:r>
+              <a:rPr lang="en-US" sz="2000" dirty="0" smtClean="0">
+                <a:latin typeface="Montserrat Light" panose="00000400000000000000" pitchFamily="50" charset="0"/>
+              </a:rPr>
+              <a:t>Peter McIntyre</a:t>
             </a:r>
             <a:endParaRPr lang="en-US" sz="2000" dirty="0" smtClean="0">
               <a:latin typeface="Montserrat Light" panose="00000400000000000000" pitchFamily="50" charset="0"/>
@@ -12334,11 +12346,7 @@
           <a:p>
             <a:r>
               <a:rPr lang="en-US" dirty="0" smtClean="0"/>
-              <a:t>Electron </a:t>
-            </a:r>
-            <a:r>
-              <a:rPr lang="en-US" dirty="0" smtClean="0"/>
-              <a:t>cooling</a:t>
+              <a:t>Electron cooling</a:t>
             </a:r>
             <a:endParaRPr lang="en-US" dirty="0"/>
           </a:p>

</xml_diff>